<commit_message>
Implement text filter, value type radio group, delete radio buttons
</commit_message>
<xml_diff>
--- a/assets/Screenshot.pptx
+++ b/assets/Screenshot.pptx
@@ -243,7 +243,7 @@
           <a:p>
             <a:fld id="{744297AD-8732-4260-BC57-FC1B87373CBE}" type="datetimeFigureOut">
               <a:rPr kumimoji="1" lang="ja-JP" altLang="en-US" smtClean="0"/>
-              <a:t>2022/5/27</a:t>
+              <a:t>2023/3/24</a:t>
             </a:fld>
             <a:endParaRPr kumimoji="1" lang="ja-JP" altLang="en-US"/>
           </a:p>
@@ -445,7 +445,7 @@
           <a:p>
             <a:fld id="{744297AD-8732-4260-BC57-FC1B87373CBE}" type="datetimeFigureOut">
               <a:rPr kumimoji="1" lang="ja-JP" altLang="en-US" smtClean="0"/>
-              <a:t>2022/5/27</a:t>
+              <a:t>2023/3/24</a:t>
             </a:fld>
             <a:endParaRPr kumimoji="1" lang="ja-JP" altLang="en-US"/>
           </a:p>
@@ -657,7 +657,7 @@
           <a:p>
             <a:fld id="{744297AD-8732-4260-BC57-FC1B87373CBE}" type="datetimeFigureOut">
               <a:rPr kumimoji="1" lang="ja-JP" altLang="en-US" smtClean="0"/>
-              <a:t>2022/5/27</a:t>
+              <a:t>2023/3/24</a:t>
             </a:fld>
             <a:endParaRPr kumimoji="1" lang="ja-JP" altLang="en-US"/>
           </a:p>
@@ -859,7 +859,7 @@
           <a:p>
             <a:fld id="{744297AD-8732-4260-BC57-FC1B87373CBE}" type="datetimeFigureOut">
               <a:rPr kumimoji="1" lang="ja-JP" altLang="en-US" smtClean="0"/>
-              <a:t>2022/5/27</a:t>
+              <a:t>2023/3/24</a:t>
             </a:fld>
             <a:endParaRPr kumimoji="1" lang="ja-JP" altLang="en-US"/>
           </a:p>
@@ -1105,7 +1105,7 @@
           <a:p>
             <a:fld id="{744297AD-8732-4260-BC57-FC1B87373CBE}" type="datetimeFigureOut">
               <a:rPr kumimoji="1" lang="ja-JP" altLang="en-US" smtClean="0"/>
-              <a:t>2022/5/27</a:t>
+              <a:t>2023/3/24</a:t>
             </a:fld>
             <a:endParaRPr kumimoji="1" lang="ja-JP" altLang="en-US"/>
           </a:p>
@@ -1401,7 +1401,7 @@
           <a:p>
             <a:fld id="{744297AD-8732-4260-BC57-FC1B87373CBE}" type="datetimeFigureOut">
               <a:rPr kumimoji="1" lang="ja-JP" altLang="en-US" smtClean="0"/>
-              <a:t>2022/5/27</a:t>
+              <a:t>2023/3/24</a:t>
             </a:fld>
             <a:endParaRPr kumimoji="1" lang="ja-JP" altLang="en-US"/>
           </a:p>
@@ -1832,7 +1832,7 @@
           <a:p>
             <a:fld id="{744297AD-8732-4260-BC57-FC1B87373CBE}" type="datetimeFigureOut">
               <a:rPr kumimoji="1" lang="ja-JP" altLang="en-US" smtClean="0"/>
-              <a:t>2022/5/27</a:t>
+              <a:t>2023/3/24</a:t>
             </a:fld>
             <a:endParaRPr kumimoji="1" lang="ja-JP" altLang="en-US"/>
           </a:p>
@@ -1950,7 +1950,7 @@
           <a:p>
             <a:fld id="{744297AD-8732-4260-BC57-FC1B87373CBE}" type="datetimeFigureOut">
               <a:rPr kumimoji="1" lang="ja-JP" altLang="en-US" smtClean="0"/>
-              <a:t>2022/5/27</a:t>
+              <a:t>2023/3/24</a:t>
             </a:fld>
             <a:endParaRPr kumimoji="1" lang="ja-JP" altLang="en-US"/>
           </a:p>
@@ -2045,7 +2045,7 @@
           <a:p>
             <a:fld id="{744297AD-8732-4260-BC57-FC1B87373CBE}" type="datetimeFigureOut">
               <a:rPr kumimoji="1" lang="ja-JP" altLang="en-US" smtClean="0"/>
-              <a:t>2022/5/27</a:t>
+              <a:t>2023/3/24</a:t>
             </a:fld>
             <a:endParaRPr kumimoji="1" lang="ja-JP" altLang="en-US"/>
           </a:p>
@@ -2354,7 +2354,7 @@
           <a:p>
             <a:fld id="{744297AD-8732-4260-BC57-FC1B87373CBE}" type="datetimeFigureOut">
               <a:rPr kumimoji="1" lang="ja-JP" altLang="en-US" smtClean="0"/>
-              <a:t>2022/5/27</a:t>
+              <a:t>2023/3/24</a:t>
             </a:fld>
             <a:endParaRPr kumimoji="1" lang="ja-JP" altLang="en-US"/>
           </a:p>
@@ -2607,7 +2607,7 @@
           <a:p>
             <a:fld id="{744297AD-8732-4260-BC57-FC1B87373CBE}" type="datetimeFigureOut">
               <a:rPr kumimoji="1" lang="ja-JP" altLang="en-US" smtClean="0"/>
-              <a:t>2022/5/27</a:t>
+              <a:t>2023/3/24</a:t>
             </a:fld>
             <a:endParaRPr kumimoji="1" lang="ja-JP" altLang="en-US"/>
           </a:p>
@@ -2852,7 +2852,7 @@
           <a:p>
             <a:fld id="{744297AD-8732-4260-BC57-FC1B87373CBE}" type="datetimeFigureOut">
               <a:rPr kumimoji="1" lang="ja-JP" altLang="en-US" smtClean="0"/>
-              <a:t>2022/5/27</a:t>
+              <a:t>2023/3/24</a:t>
             </a:fld>
             <a:endParaRPr kumimoji="1" lang="ja-JP" altLang="en-US"/>
           </a:p>
@@ -3259,7 +3259,7 @@
       </p:grpSpPr>
       <p:pic>
         <p:nvPicPr>
-          <p:cNvPr id="2" name="図 1"/>
+          <p:cNvPr id="3" name="図 2"/>
           <p:cNvPicPr>
             <a:picLocks noChangeAspect="1"/>
           </p:cNvPicPr>

</xml_diff>